<commit_message>
Add leaker script readout
</commit_message>
<xml_diff>
--- a/Day4/Day_4.pptx
+++ b/Day4/Day_4.pptx
@@ -4,6 +4,9 @@
   <p:sldMasterIdLst>
     <p:sldMasterId id="2147483648" r:id="rId1"/>
   </p:sldMasterIdLst>
+  <p:notesMasterIdLst>
+    <p:notesMasterId r:id="rId37"/>
+  </p:notesMasterIdLst>
   <p:sldIdLst>
     <p:sldId id="257" r:id="rId2"/>
     <p:sldId id="258" r:id="rId3"/>
@@ -39,6 +42,7 @@
     <p:sldId id="364" r:id="rId33"/>
     <p:sldId id="365" r:id="rId34"/>
     <p:sldId id="366" r:id="rId35"/>
+    <p:sldId id="367" r:id="rId36"/>
   </p:sldIdLst>
   <p:sldSz cx="12192000" cy="6858000"/>
   <p:notesSz cx="6858000" cy="9144000"/>
@@ -143,6 +147,480 @@
     </p:ext>
   </p:extLst>
 </p:presentation>
+</file>
+
+<file path=ppt/notesMasters/notesMaster1.xml><?xml version="1.0" encoding="utf-8"?>
+<p:notesMaster xmlns:a="http://schemas.openxmlformats.org/drawingml/2006/main" xmlns:r="http://schemas.openxmlformats.org/officeDocument/2006/relationships" xmlns:p="http://schemas.openxmlformats.org/presentationml/2006/main">
+  <p:cSld>
+    <p:bg>
+      <p:bgRef idx="1001">
+        <a:schemeClr val="bg1"/>
+      </p:bgRef>
+    </p:bg>
+    <p:spTree>
+      <p:nvGrpSpPr>
+        <p:cNvPr id="1" name=""/>
+        <p:cNvGrpSpPr/>
+        <p:nvPr/>
+      </p:nvGrpSpPr>
+      <p:grpSpPr>
+        <a:xfrm>
+          <a:off x="0" y="0"/>
+          <a:ext cx="0" cy="0"/>
+          <a:chOff x="0" y="0"/>
+          <a:chExt cx="0" cy="0"/>
+        </a:xfrm>
+      </p:grpSpPr>
+      <p:sp>
+        <p:nvSpPr>
+          <p:cNvPr id="2" name="Header Placeholder 1"/>
+          <p:cNvSpPr>
+            <a:spLocks noGrp="1"/>
+          </p:cNvSpPr>
+          <p:nvPr>
+            <p:ph type="hdr" sz="quarter"/>
+          </p:nvPr>
+        </p:nvSpPr>
+        <p:spPr>
+          <a:xfrm>
+            <a:off x="0" y="0"/>
+            <a:ext cx="2971800" cy="458788"/>
+          </a:xfrm>
+          <a:prstGeom prst="rect">
+            <a:avLst/>
+          </a:prstGeom>
+        </p:spPr>
+        <p:txBody>
+          <a:bodyPr vert="horz" lIns="91440" tIns="45720" rIns="91440" bIns="45720" rtlCol="0"/>
+          <a:lstStyle>
+            <a:lvl1pPr algn="l">
+              <a:defRPr sz="1200"/>
+            </a:lvl1pPr>
+          </a:lstStyle>
+          <a:p>
+            <a:endParaRPr lang="en-US"/>
+          </a:p>
+        </p:txBody>
+      </p:sp>
+      <p:sp>
+        <p:nvSpPr>
+          <p:cNvPr id="3" name="Date Placeholder 2"/>
+          <p:cNvSpPr>
+            <a:spLocks noGrp="1"/>
+          </p:cNvSpPr>
+          <p:nvPr>
+            <p:ph type="dt" idx="1"/>
+          </p:nvPr>
+        </p:nvSpPr>
+        <p:spPr>
+          <a:xfrm>
+            <a:off x="3884613" y="0"/>
+            <a:ext cx="2971800" cy="458788"/>
+          </a:xfrm>
+          <a:prstGeom prst="rect">
+            <a:avLst/>
+          </a:prstGeom>
+        </p:spPr>
+        <p:txBody>
+          <a:bodyPr vert="horz" lIns="91440" tIns="45720" rIns="91440" bIns="45720" rtlCol="0"/>
+          <a:lstStyle>
+            <a:lvl1pPr algn="r">
+              <a:defRPr sz="1200"/>
+            </a:lvl1pPr>
+          </a:lstStyle>
+          <a:p>
+            <a:fld id="{D9DE61F4-84B7-764E-A6D7-FCBDD6671B33}" type="datetimeFigureOut">
+              <a:rPr lang="en-US" smtClean="0"/>
+              <a:t>6/12/20</a:t>
+            </a:fld>
+            <a:endParaRPr lang="en-US"/>
+          </a:p>
+        </p:txBody>
+      </p:sp>
+      <p:sp>
+        <p:nvSpPr>
+          <p:cNvPr id="4" name="Slide Image Placeholder 3"/>
+          <p:cNvSpPr>
+            <a:spLocks noGrp="1" noRot="1" noChangeAspect="1"/>
+          </p:cNvSpPr>
+          <p:nvPr>
+            <p:ph type="sldImg" idx="2"/>
+          </p:nvPr>
+        </p:nvSpPr>
+        <p:spPr>
+          <a:xfrm>
+            <a:off x="685800" y="1143000"/>
+            <a:ext cx="5486400" cy="3086100"/>
+          </a:xfrm>
+          <a:prstGeom prst="rect">
+            <a:avLst/>
+          </a:prstGeom>
+          <a:noFill/>
+          <a:ln w="12700">
+            <a:solidFill>
+              <a:prstClr val="black"/>
+            </a:solidFill>
+          </a:ln>
+        </p:spPr>
+        <p:txBody>
+          <a:bodyPr vert="horz" lIns="91440" tIns="45720" rIns="91440" bIns="45720" rtlCol="0" anchor="ctr"/>
+          <a:lstStyle/>
+          <a:p>
+            <a:endParaRPr lang="en-US"/>
+          </a:p>
+        </p:txBody>
+      </p:sp>
+      <p:sp>
+        <p:nvSpPr>
+          <p:cNvPr id="5" name="Notes Placeholder 4"/>
+          <p:cNvSpPr>
+            <a:spLocks noGrp="1"/>
+          </p:cNvSpPr>
+          <p:nvPr>
+            <p:ph type="body" sz="quarter" idx="3"/>
+          </p:nvPr>
+        </p:nvSpPr>
+        <p:spPr>
+          <a:xfrm>
+            <a:off x="685800" y="4400550"/>
+            <a:ext cx="5486400" cy="3600450"/>
+          </a:xfrm>
+          <a:prstGeom prst="rect">
+            <a:avLst/>
+          </a:prstGeom>
+        </p:spPr>
+        <p:txBody>
+          <a:bodyPr vert="horz" lIns="91440" tIns="45720" rIns="91440" bIns="45720" rtlCol="0"/>
+          <a:lstStyle/>
+          <a:p>
+            <a:pPr lvl="0"/>
+            <a:r>
+              <a:rPr lang="en-US"/>
+              <a:t>Click to edit Master text styles</a:t>
+            </a:r>
+          </a:p>
+          <a:p>
+            <a:pPr lvl="1"/>
+            <a:r>
+              <a:rPr lang="en-US"/>
+              <a:t>Second level</a:t>
+            </a:r>
+          </a:p>
+          <a:p>
+            <a:pPr lvl="2"/>
+            <a:r>
+              <a:rPr lang="en-US"/>
+              <a:t>Third level</a:t>
+            </a:r>
+          </a:p>
+          <a:p>
+            <a:pPr lvl="3"/>
+            <a:r>
+              <a:rPr lang="en-US"/>
+              <a:t>Fourth level</a:t>
+            </a:r>
+          </a:p>
+          <a:p>
+            <a:pPr lvl="4"/>
+            <a:r>
+              <a:rPr lang="en-US"/>
+              <a:t>Fifth level</a:t>
+            </a:r>
+          </a:p>
+        </p:txBody>
+      </p:sp>
+      <p:sp>
+        <p:nvSpPr>
+          <p:cNvPr id="6" name="Footer Placeholder 5"/>
+          <p:cNvSpPr>
+            <a:spLocks noGrp="1"/>
+          </p:cNvSpPr>
+          <p:nvPr>
+            <p:ph type="ftr" sz="quarter" idx="4"/>
+          </p:nvPr>
+        </p:nvSpPr>
+        <p:spPr>
+          <a:xfrm>
+            <a:off x="0" y="8685213"/>
+            <a:ext cx="2971800" cy="458787"/>
+          </a:xfrm>
+          <a:prstGeom prst="rect">
+            <a:avLst/>
+          </a:prstGeom>
+        </p:spPr>
+        <p:txBody>
+          <a:bodyPr vert="horz" lIns="91440" tIns="45720" rIns="91440" bIns="45720" rtlCol="0" anchor="b"/>
+          <a:lstStyle>
+            <a:lvl1pPr algn="l">
+              <a:defRPr sz="1200"/>
+            </a:lvl1pPr>
+          </a:lstStyle>
+          <a:p>
+            <a:endParaRPr lang="en-US"/>
+          </a:p>
+        </p:txBody>
+      </p:sp>
+      <p:sp>
+        <p:nvSpPr>
+          <p:cNvPr id="7" name="Slide Number Placeholder 6"/>
+          <p:cNvSpPr>
+            <a:spLocks noGrp="1"/>
+          </p:cNvSpPr>
+          <p:nvPr>
+            <p:ph type="sldNum" sz="quarter" idx="5"/>
+          </p:nvPr>
+        </p:nvSpPr>
+        <p:spPr>
+          <a:xfrm>
+            <a:off x="3884613" y="8685213"/>
+            <a:ext cx="2971800" cy="458787"/>
+          </a:xfrm>
+          <a:prstGeom prst="rect">
+            <a:avLst/>
+          </a:prstGeom>
+        </p:spPr>
+        <p:txBody>
+          <a:bodyPr vert="horz" lIns="91440" tIns="45720" rIns="91440" bIns="45720" rtlCol="0" anchor="b"/>
+          <a:lstStyle>
+            <a:lvl1pPr algn="r">
+              <a:defRPr sz="1200"/>
+            </a:lvl1pPr>
+          </a:lstStyle>
+          <a:p>
+            <a:fld id="{4D837702-5F9C-CD46-A6C4-68D76361CDB5}" type="slidenum">
+              <a:rPr lang="en-US" smtClean="0"/>
+              <a:t>‹#›</a:t>
+            </a:fld>
+            <a:endParaRPr lang="en-US"/>
+          </a:p>
+        </p:txBody>
+      </p:sp>
+    </p:spTree>
+    <p:extLst>
+      <p:ext uri="{BB962C8B-B14F-4D97-AF65-F5344CB8AC3E}">
+        <p14:creationId xmlns:p14="http://schemas.microsoft.com/office/powerpoint/2010/main" val="3969890422"/>
+      </p:ext>
+    </p:extLst>
+  </p:cSld>
+  <p:clrMap bg1="lt1" tx1="dk1" bg2="lt2" tx2="dk2" accent1="accent1" accent2="accent2" accent3="accent3" accent4="accent4" accent5="accent5" accent6="accent6" hlink="hlink" folHlink="folHlink"/>
+  <p:notesStyle>
+    <a:lvl1pPr marL="0" algn="l" defTabSz="914400" rtl="0" eaLnBrk="1" latinLnBrk="0" hangingPunct="1">
+      <a:defRPr sz="1200" kern="1200">
+        <a:solidFill>
+          <a:schemeClr val="tx1"/>
+        </a:solidFill>
+        <a:latin typeface="+mn-lt"/>
+        <a:ea typeface="+mn-ea"/>
+        <a:cs typeface="+mn-cs"/>
+      </a:defRPr>
+    </a:lvl1pPr>
+    <a:lvl2pPr marL="457200" algn="l" defTabSz="914400" rtl="0" eaLnBrk="1" latinLnBrk="0" hangingPunct="1">
+      <a:defRPr sz="1200" kern="1200">
+        <a:solidFill>
+          <a:schemeClr val="tx1"/>
+        </a:solidFill>
+        <a:latin typeface="+mn-lt"/>
+        <a:ea typeface="+mn-ea"/>
+        <a:cs typeface="+mn-cs"/>
+      </a:defRPr>
+    </a:lvl2pPr>
+    <a:lvl3pPr marL="914400" algn="l" defTabSz="914400" rtl="0" eaLnBrk="1" latinLnBrk="0" hangingPunct="1">
+      <a:defRPr sz="1200" kern="1200">
+        <a:solidFill>
+          <a:schemeClr val="tx1"/>
+        </a:solidFill>
+        <a:latin typeface="+mn-lt"/>
+        <a:ea typeface="+mn-ea"/>
+        <a:cs typeface="+mn-cs"/>
+      </a:defRPr>
+    </a:lvl3pPr>
+    <a:lvl4pPr marL="1371600" algn="l" defTabSz="914400" rtl="0" eaLnBrk="1" latinLnBrk="0" hangingPunct="1">
+      <a:defRPr sz="1200" kern="1200">
+        <a:solidFill>
+          <a:schemeClr val="tx1"/>
+        </a:solidFill>
+        <a:latin typeface="+mn-lt"/>
+        <a:ea typeface="+mn-ea"/>
+        <a:cs typeface="+mn-cs"/>
+      </a:defRPr>
+    </a:lvl4pPr>
+    <a:lvl5pPr marL="1828800" algn="l" defTabSz="914400" rtl="0" eaLnBrk="1" latinLnBrk="0" hangingPunct="1">
+      <a:defRPr sz="1200" kern="1200">
+        <a:solidFill>
+          <a:schemeClr val="tx1"/>
+        </a:solidFill>
+        <a:latin typeface="+mn-lt"/>
+        <a:ea typeface="+mn-ea"/>
+        <a:cs typeface="+mn-cs"/>
+      </a:defRPr>
+    </a:lvl5pPr>
+    <a:lvl6pPr marL="2286000" algn="l" defTabSz="914400" rtl="0" eaLnBrk="1" latinLnBrk="0" hangingPunct="1">
+      <a:defRPr sz="1200" kern="1200">
+        <a:solidFill>
+          <a:schemeClr val="tx1"/>
+        </a:solidFill>
+        <a:latin typeface="+mn-lt"/>
+        <a:ea typeface="+mn-ea"/>
+        <a:cs typeface="+mn-cs"/>
+      </a:defRPr>
+    </a:lvl6pPr>
+    <a:lvl7pPr marL="2743200" algn="l" defTabSz="914400" rtl="0" eaLnBrk="1" latinLnBrk="0" hangingPunct="1">
+      <a:defRPr sz="1200" kern="1200">
+        <a:solidFill>
+          <a:schemeClr val="tx1"/>
+        </a:solidFill>
+        <a:latin typeface="+mn-lt"/>
+        <a:ea typeface="+mn-ea"/>
+        <a:cs typeface="+mn-cs"/>
+      </a:defRPr>
+    </a:lvl7pPr>
+    <a:lvl8pPr marL="3200400" algn="l" defTabSz="914400" rtl="0" eaLnBrk="1" latinLnBrk="0" hangingPunct="1">
+      <a:defRPr sz="1200" kern="1200">
+        <a:solidFill>
+          <a:schemeClr val="tx1"/>
+        </a:solidFill>
+        <a:latin typeface="+mn-lt"/>
+        <a:ea typeface="+mn-ea"/>
+        <a:cs typeface="+mn-cs"/>
+      </a:defRPr>
+    </a:lvl8pPr>
+    <a:lvl9pPr marL="3657600" algn="l" defTabSz="914400" rtl="0" eaLnBrk="1" latinLnBrk="0" hangingPunct="1">
+      <a:defRPr sz="1200" kern="1200">
+        <a:solidFill>
+          <a:schemeClr val="tx1"/>
+        </a:solidFill>
+        <a:latin typeface="+mn-lt"/>
+        <a:ea typeface="+mn-ea"/>
+        <a:cs typeface="+mn-cs"/>
+      </a:defRPr>
+    </a:lvl9pPr>
+  </p:notesStyle>
+</p:notesMaster>
+</file>
+
+<file path=ppt/notesSlides/notesSlide1.xml><?xml version="1.0" encoding="utf-8"?>
+<p:notes xmlns:a="http://schemas.openxmlformats.org/drawingml/2006/main" xmlns:r="http://schemas.openxmlformats.org/officeDocument/2006/relationships" xmlns:p="http://schemas.openxmlformats.org/presentationml/2006/main">
+  <p:cSld>
+    <p:spTree>
+      <p:nvGrpSpPr>
+        <p:cNvPr id="1" name=""/>
+        <p:cNvGrpSpPr/>
+        <p:nvPr/>
+      </p:nvGrpSpPr>
+      <p:grpSpPr>
+        <a:xfrm>
+          <a:off x="0" y="0"/>
+          <a:ext cx="0" cy="0"/>
+          <a:chOff x="0" y="0"/>
+          <a:chExt cx="0" cy="0"/>
+        </a:xfrm>
+      </p:grpSpPr>
+      <p:sp>
+        <p:nvSpPr>
+          <p:cNvPr id="2" name="Slide Image Placeholder 1"/>
+          <p:cNvSpPr>
+            <a:spLocks noGrp="1" noRot="1" noChangeAspect="1"/>
+          </p:cNvSpPr>
+          <p:nvPr>
+            <p:ph type="sldImg"/>
+          </p:nvPr>
+        </p:nvSpPr>
+        <p:spPr/>
+      </p:sp>
+      <p:sp>
+        <p:nvSpPr>
+          <p:cNvPr id="3" name="Notes Placeholder 2"/>
+          <p:cNvSpPr>
+            <a:spLocks noGrp="1"/>
+          </p:cNvSpPr>
+          <p:nvPr>
+            <p:ph type="body" idx="1"/>
+          </p:nvPr>
+        </p:nvSpPr>
+        <p:spPr/>
+        <p:txBody>
+          <a:bodyPr/>
+          <a:lstStyle/>
+          <a:p>
+            <a:r>
+              <a:rPr lang="en-US" dirty="0"/>
+              <a:t>Use breakpoint: /Users/</a:t>
+            </a:r>
+            <a:r>
+              <a:rPr lang="en-US" dirty="0" err="1"/>
+              <a:t>philipp</a:t>
+            </a:r>
+            <a:r>
+              <a:rPr lang="en-US" dirty="0"/>
+              <a:t>/Desktop/</a:t>
+            </a:r>
+            <a:r>
+              <a:rPr lang="en-US" dirty="0" err="1"/>
+              <a:t>Advanced_Summer_Camp_Course</a:t>
+            </a:r>
+            <a:r>
+              <a:rPr lang="en-US" dirty="0"/>
+              <a:t>/</a:t>
+            </a:r>
+            <a:r>
+              <a:rPr lang="en-US" dirty="0" err="1"/>
+              <a:t>Advanced_Summer_Course</a:t>
+            </a:r>
+            <a:r>
+              <a:rPr lang="en-US" dirty="0"/>
+              <a:t>/</a:t>
+            </a:r>
+            <a:r>
+              <a:rPr lang="en-US" dirty="0" err="1"/>
+              <a:t>leaker_script.sh</a:t>
+            </a:r>
+            <a:endParaRPr lang="en-US" dirty="0"/>
+          </a:p>
+          <a:p>
+            <a:endParaRPr lang="en-US" dirty="0"/>
+          </a:p>
+          <a:p>
+            <a:r>
+              <a:rPr lang="en-US" dirty="0"/>
+              <a:t>Illustrate point using malloc instead of new </a:t>
+            </a:r>
+          </a:p>
+        </p:txBody>
+      </p:sp>
+      <p:sp>
+        <p:nvSpPr>
+          <p:cNvPr id="4" name="Slide Number Placeholder 3"/>
+          <p:cNvSpPr>
+            <a:spLocks noGrp="1"/>
+          </p:cNvSpPr>
+          <p:nvPr>
+            <p:ph type="sldNum" sz="quarter" idx="5"/>
+          </p:nvPr>
+        </p:nvSpPr>
+        <p:spPr/>
+        <p:txBody>
+          <a:bodyPr/>
+          <a:lstStyle/>
+          <a:p>
+            <a:fld id="{4D837702-5F9C-CD46-A6C4-68D76361CDB5}" type="slidenum">
+              <a:rPr lang="en-US" smtClean="0"/>
+              <a:t>34</a:t>
+            </a:fld>
+            <a:endParaRPr lang="en-US"/>
+          </a:p>
+        </p:txBody>
+      </p:sp>
+    </p:spTree>
+    <p:extLst>
+      <p:ext uri="{BB962C8B-B14F-4D97-AF65-F5344CB8AC3E}">
+        <p14:creationId xmlns:p14="http://schemas.microsoft.com/office/powerpoint/2010/main" val="77779814"/>
+      </p:ext>
+    </p:extLst>
+  </p:cSld>
+  <p:clrMapOvr>
+    <a:masterClrMapping/>
+  </p:clrMapOvr>
+</p:notes>
 </file>
 
 <file path=ppt/slideLayouts/slideLayout1.xml><?xml version="1.0" encoding="utf-8"?>
@@ -12539,8 +13017,25 @@
           <a:p>
             <a:r>
               <a:rPr lang="en-US" dirty="0"/>
-              <a:t>A C++ class can be defined in the following way:</a:t>
-            </a:r>
+              <a:t>A C++ </a:t>
+            </a:r>
+            <a:r>
+              <a:rPr lang="en-US" sz="1600" dirty="0">
+                <a:solidFill>
+                  <a:srgbClr val="FF79B2"/>
+                </a:solidFill>
+                <a:latin typeface="Consolas" panose="020B0609020204030204" pitchFamily="49" charset="0"/>
+                <a:cs typeface="Consolas" panose="020B0609020204030204" pitchFamily="49" charset="0"/>
+              </a:rPr>
+              <a:t>class</a:t>
+            </a:r>
+            <a:r>
+              <a:rPr lang="en-US" dirty="0"/>
+              <a:t> can be defined in the following way:</a:t>
+            </a:r>
+          </a:p>
+          <a:p>
+            <a:endParaRPr lang="en-US" dirty="0"/>
           </a:p>
           <a:p>
             <a:endParaRPr lang="en-US" dirty="0"/>
@@ -14883,7 +15378,27 @@
           <a:p>
             <a:r>
               <a:rPr lang="en-US" dirty="0"/>
-              <a:t>The heap is a large slice of memory accessible to our program, which stores dynamically created objects</a:t>
+              <a:t>The </a:t>
+            </a:r>
+            <a:r>
+              <a:rPr lang="en-US" b="1" dirty="0"/>
+              <a:t>heap</a:t>
+            </a:r>
+            <a:r>
+              <a:rPr lang="en-US" dirty="0"/>
+              <a:t> is a </a:t>
+            </a:r>
+            <a:r>
+              <a:rPr lang="en-US" b="1" dirty="0"/>
+              <a:t>large slice of memory</a:t>
+            </a:r>
+            <a:r>
+              <a:rPr lang="en-US" dirty="0"/>
+              <a:t> accessible to our program, which stores </a:t>
+            </a:r>
+            <a:r>
+              <a:rPr lang="en-US" b="1" dirty="0"/>
+              <a:t>dynamically created objects</a:t>
             </a:r>
           </a:p>
           <a:p>
@@ -15318,7 +15833,7 @@
         <p:spPr>
           <a:xfrm>
             <a:off x="1141412" y="2249487"/>
-            <a:ext cx="9905999" cy="3111183"/>
+            <a:ext cx="10122058" cy="3111183"/>
           </a:xfrm>
         </p:spPr>
         <p:txBody>
@@ -15330,7 +15845,7 @@
               <a:t>Now that we have a </a:t>
             </a:r>
             <a:r>
-              <a:rPr lang="en-US" sz="1800" dirty="0" err="1">
+              <a:rPr lang="en-US" sz="1800" b="1" dirty="0" err="1">
                 <a:solidFill>
                   <a:schemeClr val="tx2">
                     <a:lumMod val="50000"/>
@@ -15342,9 +15857,16 @@
               <a:t>CarClass</a:t>
             </a:r>
             <a:r>
+              <a:rPr lang="en-US" b="1" dirty="0"/>
+              <a:t> instance</a:t>
+            </a:r>
+            <a:r>
               <a:rPr lang="en-US" dirty="0"/>
-              <a:t> instance (object) lets try and do something with it</a:t>
-            </a:r>
+              <a:t> (object) lets try and do something with it</a:t>
+            </a:r>
+          </a:p>
+          <a:p>
+            <a:endParaRPr lang="en-US" dirty="0"/>
           </a:p>
           <a:p>
             <a:r>
@@ -15417,7 +15939,7 @@
         </p:blipFill>
         <p:spPr>
           <a:xfrm>
-            <a:off x="1423035" y="4926395"/>
+            <a:off x="1423035" y="4980896"/>
             <a:ext cx="3064510" cy="434275"/>
           </a:xfrm>
           <a:prstGeom prst="rect">
@@ -15682,7 +16204,7 @@
         <p:spPr/>
         <p:txBody>
           <a:bodyPr>
-            <a:normAutofit lnSpcReduction="10000"/>
+            <a:normAutofit fontScale="92500" lnSpcReduction="10000"/>
           </a:bodyPr>
           <a:lstStyle/>
           <a:p>
@@ -15692,7 +16214,15 @@
             </a:r>
             <a:r>
               <a:rPr lang="en-US" dirty="0"/>
-              <a:t> keeps going on about “its private”, what does that even mean?</a:t>
+              <a:t> keeps going on about “</a:t>
+            </a:r>
+            <a:r>
+              <a:rPr lang="en-US" b="1" dirty="0"/>
+              <a:t>its private</a:t>
+            </a:r>
+            <a:r>
+              <a:rPr lang="en-US" dirty="0"/>
+              <a:t>”, what does that even mean?</a:t>
             </a:r>
           </a:p>
           <a:p>
@@ -15700,11 +16230,38 @@
           </a:p>
           <a:p>
             <a:r>
+              <a:rPr lang="en-US" b="1" dirty="0"/>
+              <a:t>Member variables &amp; functions</a:t>
+            </a:r>
+            <a:r>
               <a:rPr lang="en-US" dirty="0"/>
-              <a:t>Member variables &amp; functions of a class are private by default, that is to say: “The only thing that can access these things are the class and objects which are also of the </a:t>
-            </a:r>
-            <a:r>
-              <a:rPr lang="en-US" sz="1800" dirty="0" err="1">
+              <a:t> of a </a:t>
+            </a:r>
+            <a:r>
+              <a:rPr lang="en-US" b="1" u="sng" dirty="0"/>
+              <a:t>class</a:t>
+            </a:r>
+            <a:r>
+              <a:rPr lang="en-US" dirty="0"/>
+              <a:t> are </a:t>
+            </a:r>
+            <a:r>
+              <a:rPr lang="en-US" b="1" dirty="0"/>
+              <a:t>private by default</a:t>
+            </a:r>
+          </a:p>
+          <a:p>
+            <a:pPr lvl="1"/>
+            <a:r>
+              <a:rPr lang="en-US" b="1" dirty="0"/>
+              <a:t>Simply: </a:t>
+            </a:r>
+            <a:r>
+              <a:rPr lang="en-US" dirty="0"/>
+              <a:t>“The only thing that can access these things are the class and objects which are also of the </a:t>
+            </a:r>
+            <a:r>
+              <a:rPr lang="en-US" sz="1400" dirty="0" err="1">
                 <a:solidFill>
                   <a:schemeClr val="tx2">
                     <a:lumMod val="50000"/>
@@ -15726,7 +16283,7 @@
           <a:p>
             <a:r>
               <a:rPr lang="en-US" dirty="0"/>
-              <a:t>So in other words the class is saying we aren’t allowed to access these things</a:t>
+              <a:t>So in other words the class is saying we aren’t allowed to access these instance variables</a:t>
             </a:r>
           </a:p>
         </p:txBody>
@@ -15987,7 +16544,15 @@
               <a:t>If we looked at what the values inside the </a:t>
             </a:r>
             <a:r>
-              <a:rPr lang="en-US" dirty="0" err="1"/>
+              <a:rPr lang="en-US" sz="1600" dirty="0" err="1">
+                <a:solidFill>
+                  <a:schemeClr val="tx2">
+                    <a:lumMod val="75000"/>
+                  </a:schemeClr>
+                </a:solidFill>
+                <a:latin typeface="Consolas" panose="020B0609020204030204" pitchFamily="49" charset="0"/>
+                <a:cs typeface="Consolas" panose="020B0609020204030204" pitchFamily="49" charset="0"/>
+              </a:rPr>
               <a:t>pCarObject</a:t>
             </a:r>
             <a:r>
@@ -16288,7 +16853,7 @@
           <a:p>
             <a:r>
               <a:rPr lang="en-US" dirty="0"/>
-              <a:t>Well wouldn’t it be nice if we could create something that constructs the object according to our specifications, or some default values?</a:t>
+              <a:t>Wouldn’t it be nice if we could create something that constructs the object according to our specifications, or some default values?</a:t>
             </a:r>
           </a:p>
           <a:p>
@@ -16316,7 +16881,27 @@
             <a:pPr lvl="1"/>
             <a:r>
               <a:rPr lang="en-US" dirty="0"/>
-              <a:t>It’s the factory that reads the blueprint and produces the car</a:t>
+              <a:t>It’s </a:t>
+            </a:r>
+            <a:r>
+              <a:rPr lang="en-US" b="1" dirty="0"/>
+              <a:t>the factory</a:t>
+            </a:r>
+            <a:r>
+              <a:rPr lang="en-US" dirty="0"/>
+              <a:t> that </a:t>
+            </a:r>
+            <a:r>
+              <a:rPr lang="en-US" b="1" dirty="0"/>
+              <a:t>reads the blueprint</a:t>
+            </a:r>
+            <a:r>
+              <a:rPr lang="en-US" dirty="0"/>
+              <a:t> and </a:t>
+            </a:r>
+            <a:r>
+              <a:rPr lang="en-US" b="1" dirty="0"/>
+              <a:t>produces the actual car object</a:t>
             </a:r>
           </a:p>
           <a:p>
@@ -16326,7 +16911,7 @@
           <a:p>
             <a:r>
               <a:rPr lang="en-US" dirty="0"/>
-              <a:t>So lets just write a </a:t>
+              <a:t>So lets write a </a:t>
             </a:r>
             <a:r>
               <a:rPr lang="en-US" b="1" dirty="0"/>
@@ -16366,6 +16951,518 @@
   <p:clrMapOvr>
     <a:masterClrMapping/>
   </p:clrMapOvr>
+  <p:timing>
+    <p:tnLst>
+      <p:par>
+        <p:cTn id="1" dur="indefinite" restart="never" nodeType="tmRoot">
+          <p:childTnLst>
+            <p:seq concurrent="1" nextAc="seek">
+              <p:cTn id="2" dur="indefinite" nodeType="mainSeq">
+                <p:childTnLst>
+                  <p:par>
+                    <p:cTn id="3" fill="hold">
+                      <p:stCondLst>
+                        <p:cond delay="indefinite"/>
+                      </p:stCondLst>
+                      <p:childTnLst>
+                        <p:par>
+                          <p:cTn id="4" fill="hold">
+                            <p:stCondLst>
+                              <p:cond delay="0"/>
+                            </p:stCondLst>
+                            <p:childTnLst>
+                              <p:par>
+                                <p:cTn id="5" presetID="2" presetClass="entr" presetSubtype="4" fill="hold" grpId="0" nodeType="clickEffect">
+                                  <p:stCondLst>
+                                    <p:cond delay="0"/>
+                                  </p:stCondLst>
+                                  <p:childTnLst>
+                                    <p:set>
+                                      <p:cBhvr>
+                                        <p:cTn id="6" dur="1" fill="hold">
+                                          <p:stCondLst>
+                                            <p:cond delay="0"/>
+                                          </p:stCondLst>
+                                        </p:cTn>
+                                        <p:tgtEl>
+                                          <p:spTgt spid="3">
+                                            <p:txEl>
+                                              <p:pRg st="0" end="0"/>
+                                            </p:txEl>
+                                          </p:spTgt>
+                                        </p:tgtEl>
+                                        <p:attrNameLst>
+                                          <p:attrName>style.visibility</p:attrName>
+                                        </p:attrNameLst>
+                                      </p:cBhvr>
+                                      <p:to>
+                                        <p:strVal val="visible"/>
+                                      </p:to>
+                                    </p:set>
+                                    <p:anim calcmode="lin" valueType="num">
+                                      <p:cBhvr additive="base">
+                                        <p:cTn id="7" dur="500" fill="hold"/>
+                                        <p:tgtEl>
+                                          <p:spTgt spid="3">
+                                            <p:txEl>
+                                              <p:pRg st="0" end="0"/>
+                                            </p:txEl>
+                                          </p:spTgt>
+                                        </p:tgtEl>
+                                        <p:attrNameLst>
+                                          <p:attrName>ppt_x</p:attrName>
+                                        </p:attrNameLst>
+                                      </p:cBhvr>
+                                      <p:tavLst>
+                                        <p:tav tm="0">
+                                          <p:val>
+                                            <p:strVal val="#ppt_x"/>
+                                          </p:val>
+                                        </p:tav>
+                                        <p:tav tm="100000">
+                                          <p:val>
+                                            <p:strVal val="#ppt_x"/>
+                                          </p:val>
+                                        </p:tav>
+                                      </p:tavLst>
+                                    </p:anim>
+                                    <p:anim calcmode="lin" valueType="num">
+                                      <p:cBhvr additive="base">
+                                        <p:cTn id="8" dur="500" fill="hold"/>
+                                        <p:tgtEl>
+                                          <p:spTgt spid="3">
+                                            <p:txEl>
+                                              <p:pRg st="0" end="0"/>
+                                            </p:txEl>
+                                          </p:spTgt>
+                                        </p:tgtEl>
+                                        <p:attrNameLst>
+                                          <p:attrName>ppt_y</p:attrName>
+                                        </p:attrNameLst>
+                                      </p:cBhvr>
+                                      <p:tavLst>
+                                        <p:tav tm="0">
+                                          <p:val>
+                                            <p:strVal val="1+#ppt_h/2"/>
+                                          </p:val>
+                                        </p:tav>
+                                        <p:tav tm="100000">
+                                          <p:val>
+                                            <p:strVal val="#ppt_y"/>
+                                          </p:val>
+                                        </p:tav>
+                                      </p:tavLst>
+                                    </p:anim>
+                                  </p:childTnLst>
+                                </p:cTn>
+                              </p:par>
+                            </p:childTnLst>
+                          </p:cTn>
+                        </p:par>
+                      </p:childTnLst>
+                    </p:cTn>
+                  </p:par>
+                  <p:par>
+                    <p:cTn id="9" fill="hold">
+                      <p:stCondLst>
+                        <p:cond delay="indefinite"/>
+                      </p:stCondLst>
+                      <p:childTnLst>
+                        <p:par>
+                          <p:cTn id="10" fill="hold">
+                            <p:stCondLst>
+                              <p:cond delay="0"/>
+                            </p:stCondLst>
+                            <p:childTnLst>
+                              <p:par>
+                                <p:cTn id="11" presetID="2" presetClass="entr" presetSubtype="4" fill="hold" grpId="0" nodeType="clickEffect">
+                                  <p:stCondLst>
+                                    <p:cond delay="0"/>
+                                  </p:stCondLst>
+                                  <p:childTnLst>
+                                    <p:set>
+                                      <p:cBhvr>
+                                        <p:cTn id="12" dur="1" fill="hold">
+                                          <p:stCondLst>
+                                            <p:cond delay="0"/>
+                                          </p:stCondLst>
+                                        </p:cTn>
+                                        <p:tgtEl>
+                                          <p:spTgt spid="3">
+                                            <p:txEl>
+                                              <p:pRg st="2" end="2"/>
+                                            </p:txEl>
+                                          </p:spTgt>
+                                        </p:tgtEl>
+                                        <p:attrNameLst>
+                                          <p:attrName>style.visibility</p:attrName>
+                                        </p:attrNameLst>
+                                      </p:cBhvr>
+                                      <p:to>
+                                        <p:strVal val="visible"/>
+                                      </p:to>
+                                    </p:set>
+                                    <p:anim calcmode="lin" valueType="num">
+                                      <p:cBhvr additive="base">
+                                        <p:cTn id="13" dur="500" fill="hold"/>
+                                        <p:tgtEl>
+                                          <p:spTgt spid="3">
+                                            <p:txEl>
+                                              <p:pRg st="2" end="2"/>
+                                            </p:txEl>
+                                          </p:spTgt>
+                                        </p:tgtEl>
+                                        <p:attrNameLst>
+                                          <p:attrName>ppt_x</p:attrName>
+                                        </p:attrNameLst>
+                                      </p:cBhvr>
+                                      <p:tavLst>
+                                        <p:tav tm="0">
+                                          <p:val>
+                                            <p:strVal val="#ppt_x"/>
+                                          </p:val>
+                                        </p:tav>
+                                        <p:tav tm="100000">
+                                          <p:val>
+                                            <p:strVal val="#ppt_x"/>
+                                          </p:val>
+                                        </p:tav>
+                                      </p:tavLst>
+                                    </p:anim>
+                                    <p:anim calcmode="lin" valueType="num">
+                                      <p:cBhvr additive="base">
+                                        <p:cTn id="14" dur="500" fill="hold"/>
+                                        <p:tgtEl>
+                                          <p:spTgt spid="3">
+                                            <p:txEl>
+                                              <p:pRg st="2" end="2"/>
+                                            </p:txEl>
+                                          </p:spTgt>
+                                        </p:tgtEl>
+                                        <p:attrNameLst>
+                                          <p:attrName>ppt_y</p:attrName>
+                                        </p:attrNameLst>
+                                      </p:cBhvr>
+                                      <p:tavLst>
+                                        <p:tav tm="0">
+                                          <p:val>
+                                            <p:strVal val="1+#ppt_h/2"/>
+                                          </p:val>
+                                        </p:tav>
+                                        <p:tav tm="100000">
+                                          <p:val>
+                                            <p:strVal val="#ppt_y"/>
+                                          </p:val>
+                                        </p:tav>
+                                      </p:tavLst>
+                                    </p:anim>
+                                  </p:childTnLst>
+                                </p:cTn>
+                              </p:par>
+                              <p:par>
+                                <p:cTn id="15" presetID="2" presetClass="entr" presetSubtype="4" fill="hold" grpId="0" nodeType="withEffect">
+                                  <p:stCondLst>
+                                    <p:cond delay="0"/>
+                                  </p:stCondLst>
+                                  <p:childTnLst>
+                                    <p:set>
+                                      <p:cBhvr>
+                                        <p:cTn id="16" dur="1" fill="hold">
+                                          <p:stCondLst>
+                                            <p:cond delay="0"/>
+                                          </p:stCondLst>
+                                        </p:cTn>
+                                        <p:tgtEl>
+                                          <p:spTgt spid="3">
+                                            <p:txEl>
+                                              <p:pRg st="3" end="3"/>
+                                            </p:txEl>
+                                          </p:spTgt>
+                                        </p:tgtEl>
+                                        <p:attrNameLst>
+                                          <p:attrName>style.visibility</p:attrName>
+                                        </p:attrNameLst>
+                                      </p:cBhvr>
+                                      <p:to>
+                                        <p:strVal val="visible"/>
+                                      </p:to>
+                                    </p:set>
+                                    <p:anim calcmode="lin" valueType="num">
+                                      <p:cBhvr additive="base">
+                                        <p:cTn id="17" dur="500" fill="hold"/>
+                                        <p:tgtEl>
+                                          <p:spTgt spid="3">
+                                            <p:txEl>
+                                              <p:pRg st="3" end="3"/>
+                                            </p:txEl>
+                                          </p:spTgt>
+                                        </p:tgtEl>
+                                        <p:attrNameLst>
+                                          <p:attrName>ppt_x</p:attrName>
+                                        </p:attrNameLst>
+                                      </p:cBhvr>
+                                      <p:tavLst>
+                                        <p:tav tm="0">
+                                          <p:val>
+                                            <p:strVal val="#ppt_x"/>
+                                          </p:val>
+                                        </p:tav>
+                                        <p:tav tm="100000">
+                                          <p:val>
+                                            <p:strVal val="#ppt_x"/>
+                                          </p:val>
+                                        </p:tav>
+                                      </p:tavLst>
+                                    </p:anim>
+                                    <p:anim calcmode="lin" valueType="num">
+                                      <p:cBhvr additive="base">
+                                        <p:cTn id="18" dur="500" fill="hold"/>
+                                        <p:tgtEl>
+                                          <p:spTgt spid="3">
+                                            <p:txEl>
+                                              <p:pRg st="3" end="3"/>
+                                            </p:txEl>
+                                          </p:spTgt>
+                                        </p:tgtEl>
+                                        <p:attrNameLst>
+                                          <p:attrName>ppt_y</p:attrName>
+                                        </p:attrNameLst>
+                                      </p:cBhvr>
+                                      <p:tavLst>
+                                        <p:tav tm="0">
+                                          <p:val>
+                                            <p:strVal val="1+#ppt_h/2"/>
+                                          </p:val>
+                                        </p:tav>
+                                        <p:tav tm="100000">
+                                          <p:val>
+                                            <p:strVal val="#ppt_y"/>
+                                          </p:val>
+                                        </p:tav>
+                                      </p:tavLst>
+                                    </p:anim>
+                                  </p:childTnLst>
+                                </p:cTn>
+                              </p:par>
+                            </p:childTnLst>
+                          </p:cTn>
+                        </p:par>
+                      </p:childTnLst>
+                    </p:cTn>
+                  </p:par>
+                  <p:par>
+                    <p:cTn id="19" fill="hold">
+                      <p:stCondLst>
+                        <p:cond delay="indefinite"/>
+                      </p:stCondLst>
+                      <p:childTnLst>
+                        <p:par>
+                          <p:cTn id="20" fill="hold">
+                            <p:stCondLst>
+                              <p:cond delay="0"/>
+                            </p:stCondLst>
+                            <p:childTnLst>
+                              <p:par>
+                                <p:cTn id="21" presetID="2" presetClass="entr" presetSubtype="4" fill="hold" grpId="0" nodeType="clickEffect">
+                                  <p:stCondLst>
+                                    <p:cond delay="0"/>
+                                  </p:stCondLst>
+                                  <p:childTnLst>
+                                    <p:set>
+                                      <p:cBhvr>
+                                        <p:cTn id="22" dur="1" fill="hold">
+                                          <p:stCondLst>
+                                            <p:cond delay="0"/>
+                                          </p:stCondLst>
+                                        </p:cTn>
+                                        <p:tgtEl>
+                                          <p:spTgt spid="3">
+                                            <p:txEl>
+                                              <p:pRg st="5" end="5"/>
+                                            </p:txEl>
+                                          </p:spTgt>
+                                        </p:tgtEl>
+                                        <p:attrNameLst>
+                                          <p:attrName>style.visibility</p:attrName>
+                                        </p:attrNameLst>
+                                      </p:cBhvr>
+                                      <p:to>
+                                        <p:strVal val="visible"/>
+                                      </p:to>
+                                    </p:set>
+                                    <p:anim calcmode="lin" valueType="num">
+                                      <p:cBhvr additive="base">
+                                        <p:cTn id="23" dur="500" fill="hold"/>
+                                        <p:tgtEl>
+                                          <p:spTgt spid="3">
+                                            <p:txEl>
+                                              <p:pRg st="5" end="5"/>
+                                            </p:txEl>
+                                          </p:spTgt>
+                                        </p:tgtEl>
+                                        <p:attrNameLst>
+                                          <p:attrName>ppt_x</p:attrName>
+                                        </p:attrNameLst>
+                                      </p:cBhvr>
+                                      <p:tavLst>
+                                        <p:tav tm="0">
+                                          <p:val>
+                                            <p:strVal val="#ppt_x"/>
+                                          </p:val>
+                                        </p:tav>
+                                        <p:tav tm="100000">
+                                          <p:val>
+                                            <p:strVal val="#ppt_x"/>
+                                          </p:val>
+                                        </p:tav>
+                                      </p:tavLst>
+                                    </p:anim>
+                                    <p:anim calcmode="lin" valueType="num">
+                                      <p:cBhvr additive="base">
+                                        <p:cTn id="24" dur="500" fill="hold"/>
+                                        <p:tgtEl>
+                                          <p:spTgt spid="3">
+                                            <p:txEl>
+                                              <p:pRg st="5" end="5"/>
+                                            </p:txEl>
+                                          </p:spTgt>
+                                        </p:tgtEl>
+                                        <p:attrNameLst>
+                                          <p:attrName>ppt_y</p:attrName>
+                                        </p:attrNameLst>
+                                      </p:cBhvr>
+                                      <p:tavLst>
+                                        <p:tav tm="0">
+                                          <p:val>
+                                            <p:strVal val="1+#ppt_h/2"/>
+                                          </p:val>
+                                        </p:tav>
+                                        <p:tav tm="100000">
+                                          <p:val>
+                                            <p:strVal val="#ppt_y"/>
+                                          </p:val>
+                                        </p:tav>
+                                      </p:tavLst>
+                                    </p:anim>
+                                  </p:childTnLst>
+                                </p:cTn>
+                              </p:par>
+                              <p:par>
+                                <p:cTn id="25" presetID="2" presetClass="entr" presetSubtype="4" fill="hold" grpId="0" nodeType="withEffect">
+                                  <p:stCondLst>
+                                    <p:cond delay="0"/>
+                                  </p:stCondLst>
+                                  <p:childTnLst>
+                                    <p:set>
+                                      <p:cBhvr>
+                                        <p:cTn id="26" dur="1" fill="hold">
+                                          <p:stCondLst>
+                                            <p:cond delay="0"/>
+                                          </p:stCondLst>
+                                        </p:cTn>
+                                        <p:tgtEl>
+                                          <p:spTgt spid="3">
+                                            <p:txEl>
+                                              <p:pRg st="6" end="6"/>
+                                            </p:txEl>
+                                          </p:spTgt>
+                                        </p:tgtEl>
+                                        <p:attrNameLst>
+                                          <p:attrName>style.visibility</p:attrName>
+                                        </p:attrNameLst>
+                                      </p:cBhvr>
+                                      <p:to>
+                                        <p:strVal val="visible"/>
+                                      </p:to>
+                                    </p:set>
+                                    <p:anim calcmode="lin" valueType="num">
+                                      <p:cBhvr additive="base">
+                                        <p:cTn id="27" dur="500" fill="hold"/>
+                                        <p:tgtEl>
+                                          <p:spTgt spid="3">
+                                            <p:txEl>
+                                              <p:pRg st="6" end="6"/>
+                                            </p:txEl>
+                                          </p:spTgt>
+                                        </p:tgtEl>
+                                        <p:attrNameLst>
+                                          <p:attrName>ppt_x</p:attrName>
+                                        </p:attrNameLst>
+                                      </p:cBhvr>
+                                      <p:tavLst>
+                                        <p:tav tm="0">
+                                          <p:val>
+                                            <p:strVal val="#ppt_x"/>
+                                          </p:val>
+                                        </p:tav>
+                                        <p:tav tm="100000">
+                                          <p:val>
+                                            <p:strVal val="#ppt_x"/>
+                                          </p:val>
+                                        </p:tav>
+                                      </p:tavLst>
+                                    </p:anim>
+                                    <p:anim calcmode="lin" valueType="num">
+                                      <p:cBhvr additive="base">
+                                        <p:cTn id="28" dur="500" fill="hold"/>
+                                        <p:tgtEl>
+                                          <p:spTgt spid="3">
+                                            <p:txEl>
+                                              <p:pRg st="6" end="6"/>
+                                            </p:txEl>
+                                          </p:spTgt>
+                                        </p:tgtEl>
+                                        <p:attrNameLst>
+                                          <p:attrName>ppt_y</p:attrName>
+                                        </p:attrNameLst>
+                                      </p:cBhvr>
+                                      <p:tavLst>
+                                        <p:tav tm="0">
+                                          <p:val>
+                                            <p:strVal val="1+#ppt_h/2"/>
+                                          </p:val>
+                                        </p:tav>
+                                        <p:tav tm="100000">
+                                          <p:val>
+                                            <p:strVal val="#ppt_y"/>
+                                          </p:val>
+                                        </p:tav>
+                                      </p:tavLst>
+                                    </p:anim>
+                                  </p:childTnLst>
+                                </p:cTn>
+                              </p:par>
+                            </p:childTnLst>
+                          </p:cTn>
+                        </p:par>
+                      </p:childTnLst>
+                    </p:cTn>
+                  </p:par>
+                </p:childTnLst>
+              </p:cTn>
+              <p:prevCondLst>
+                <p:cond evt="onPrev" delay="0">
+                  <p:tgtEl>
+                    <p:sldTgt/>
+                  </p:tgtEl>
+                </p:cond>
+              </p:prevCondLst>
+              <p:nextCondLst>
+                <p:cond evt="onNext" delay="0">
+                  <p:tgtEl>
+                    <p:sldTgt/>
+                  </p:tgtEl>
+                </p:cond>
+              </p:nextCondLst>
+            </p:seq>
+          </p:childTnLst>
+        </p:cTn>
+      </p:par>
+    </p:tnLst>
+    <p:bldLst>
+      <p:bldP spid="3" grpId="0" build="p"/>
+    </p:bldLst>
+  </p:timing>
 </p:sld>
 </file>
 
@@ -16434,19 +17531,81 @@
         <p:spPr>
           <a:xfrm>
             <a:off x="1141412" y="2249486"/>
-            <a:ext cx="9905999" cy="4138613"/>
+            <a:ext cx="9905999" cy="2832419"/>
           </a:xfrm>
         </p:spPr>
         <p:txBody>
           <a:bodyPr>
-            <a:normAutofit/>
+            <a:normAutofit fontScale="92500" lnSpcReduction="10000"/>
           </a:bodyPr>
           <a:lstStyle/>
           <a:p>
             <a:r>
               <a:rPr lang="en-US" sz="2000" dirty="0"/>
-              <a:t>This is what our default constructor looks like inside the class</a:t>
-            </a:r>
+              <a:t>This is what our </a:t>
+            </a:r>
+            <a:r>
+              <a:rPr lang="en-US" sz="2000" b="1" dirty="0"/>
+              <a:t>default constructor</a:t>
+            </a:r>
+            <a:r>
+              <a:rPr lang="en-US" sz="2000" dirty="0"/>
+              <a:t> looks like inside the class, note that the constructor MUST be public in order for us to use it</a:t>
+            </a:r>
+          </a:p>
+          <a:p>
+            <a:pPr lvl="1"/>
+            <a:r>
+              <a:rPr lang="en-US" sz="1600" dirty="0"/>
+              <a:t>This </a:t>
+            </a:r>
+            <a:r>
+              <a:rPr lang="en-US" sz="1600" b="1" dirty="0"/>
+              <a:t>constructor</a:t>
+            </a:r>
+            <a:r>
+              <a:rPr lang="en-US" sz="1600" dirty="0"/>
+              <a:t> is </a:t>
+            </a:r>
+            <a:r>
+              <a:rPr lang="en-US" sz="1600" b="1" u="sng" dirty="0"/>
+              <a:t>INSIDE</a:t>
+            </a:r>
+            <a:r>
+              <a:rPr lang="en-US" sz="1600" dirty="0"/>
+              <a:t> the </a:t>
+            </a:r>
+            <a:r>
+              <a:rPr lang="en-US" sz="1200" b="1" dirty="0" err="1">
+                <a:solidFill>
+                  <a:srgbClr val="00B0F0"/>
+                </a:solidFill>
+                <a:latin typeface="Consolas" panose="020B0609020204030204" pitchFamily="49" charset="0"/>
+                <a:cs typeface="Consolas" panose="020B0609020204030204" pitchFamily="49" charset="0"/>
+              </a:rPr>
+              <a:t>CarClass</a:t>
+            </a:r>
+            <a:r>
+              <a:rPr lang="en-US" sz="1600" b="1" dirty="0"/>
+              <a:t> </a:t>
+            </a:r>
+            <a:r>
+              <a:rPr lang="en-US" sz="1200" b="1" dirty="0">
+                <a:solidFill>
+                  <a:srgbClr val="FF79B2"/>
+                </a:solidFill>
+                <a:latin typeface="Consolas" panose="020B0609020204030204" pitchFamily="49" charset="0"/>
+                <a:cs typeface="Consolas" panose="020B0609020204030204" pitchFamily="49" charset="0"/>
+              </a:rPr>
+              <a:t>class</a:t>
+            </a:r>
+            <a:endParaRPr lang="en-US" sz="1600" b="1" dirty="0">
+              <a:solidFill>
+                <a:srgbClr val="FF79B2"/>
+              </a:solidFill>
+              <a:latin typeface="Consolas" panose="020B0609020204030204" pitchFamily="49" charset="0"/>
+              <a:cs typeface="Consolas" panose="020B0609020204030204" pitchFamily="49" charset="0"/>
+            </a:endParaRPr>
           </a:p>
           <a:p>
             <a:endParaRPr lang="en-US" sz="2000" dirty="0"/>
@@ -16461,18 +17620,15 @@
             <a:endParaRPr lang="en-US" sz="2000" dirty="0"/>
           </a:p>
           <a:p>
-            <a:pPr marL="0" indent="0">
-              <a:buNone/>
-            </a:pPr>
-            <a:endParaRPr lang="en-US" sz="2000" dirty="0"/>
-          </a:p>
-          <a:p>
             <a:r>
               <a:rPr lang="en-US" sz="2000" dirty="0"/>
               <a:t>What would the member variables of </a:t>
             </a:r>
             <a:r>
-              <a:rPr lang="en-US" sz="2000" dirty="0" err="1"/>
+              <a:rPr lang="en-US" sz="1700" b="1" dirty="0" err="1">
+                <a:latin typeface="Consolas" panose="020B0609020204030204" pitchFamily="49" charset="0"/>
+                <a:cs typeface="Consolas" panose="020B0609020204030204" pitchFamily="49" charset="0"/>
+              </a:rPr>
               <a:t>pCarObject</a:t>
             </a:r>
             <a:r>
@@ -16504,7 +17660,7 @@
         </p:blipFill>
         <p:spPr>
           <a:xfrm>
-            <a:off x="2325370" y="5081905"/>
+            <a:off x="3869555" y="5234303"/>
             <a:ext cx="3289300" cy="1574800"/>
           </a:xfrm>
           <a:prstGeom prst="rect">
@@ -16526,16 +17682,15 @@
           </p:cNvPicPr>
           <p:nvPr/>
         </p:nvPicPr>
-        <p:blipFill>
+        <p:blipFill rotWithShape="1">
           <a:blip r:embed="rId3"/>
-          <a:stretch>
-            <a:fillRect/>
-          </a:stretch>
+          <a:srcRect t="42998" b="4580"/>
+          <a:stretch/>
         </p:blipFill>
         <p:spPr>
           <a:xfrm>
-            <a:off x="7520939" y="2278061"/>
-            <a:ext cx="2665149" cy="2518294"/>
+            <a:off x="5334857" y="2895718"/>
+            <a:ext cx="2665149" cy="1320128"/>
           </a:xfrm>
           <a:prstGeom prst="rect">
             <a:avLst/>
@@ -17382,19 +18537,24 @@
           <a:p>
             <a:r>
               <a:rPr lang="en-US" dirty="0"/>
-              <a:t>What if we wanted to just change a selection of attributes, and leave others at their default value?</a:t>
+              <a:t>What if we wanted to just initialize some of the instance variables and leave others at their default value?</a:t>
             </a:r>
           </a:p>
           <a:p>
             <a:endParaRPr lang="en-US" dirty="0"/>
           </a:p>
           <a:p>
-            <a:endParaRPr lang="en-US" dirty="0"/>
-          </a:p>
-          <a:p>
             <a:r>
               <a:rPr lang="en-US" dirty="0"/>
-              <a:t>We can use an initialization list, and actually rewrite the custom constructor we wrote before to replace the default constructor all together </a:t>
+              <a:t>We can use an </a:t>
+            </a:r>
+            <a:r>
+              <a:rPr lang="en-US" b="1" dirty="0"/>
+              <a:t>initialization list</a:t>
+            </a:r>
+            <a:r>
+              <a:rPr lang="en-US" dirty="0"/>
+              <a:t> and actually rewrite the custom constructor from before to replace the default constructor all together </a:t>
             </a:r>
           </a:p>
           <a:p>
@@ -17407,7 +18567,7 @@
             </a:r>
             <a:r>
               <a:rPr lang="en-US" dirty="0"/>
-              <a:t>: We will end up with one constructor which can take any number of arguments and automatically initializes all member variable to their default values</a:t>
+              <a:t>: We will end up with one constructor which can take any number of arguments to initialize said instance variables, while automatically initializing all other member variable to their default values</a:t>
             </a:r>
           </a:p>
         </p:txBody>
@@ -18637,15 +19797,7 @@
           <a:p>
             <a:r>
               <a:rPr lang="en-US" dirty="0"/>
-              <a:t>What’s the problem now? Everything is working just like we want it to, so </a:t>
-            </a:r>
-            <a:r>
-              <a:rPr lang="en-US" dirty="0" err="1"/>
-              <a:t>whats</a:t>
-            </a:r>
-            <a:r>
-              <a:rPr lang="en-US" dirty="0"/>
-              <a:t> going wrong?</a:t>
+              <a:t>What’s the problem now? Everything is working just like we want it to, so what’s going wrong?</a:t>
             </a:r>
           </a:p>
           <a:p>
@@ -18716,7 +19868,7 @@
             <a:pPr algn="ctr"/>
             <a:r>
               <a:rPr lang="en-US" b="1" dirty="0"/>
-              <a:t>Heap memory allocation</a:t>
+              <a:t>Memory leaks</a:t>
             </a:r>
           </a:p>
         </p:txBody>
@@ -18811,7 +19963,7 @@
           <a:p>
             <a:r>
               <a:rPr lang="en-US" dirty="0"/>
-              <a:t>The dangerous thing is, that we can’t actually see this unless we are explicitly looking for it</a:t>
+              <a:t>The dangerous thing is, that we can’t actually see these leaks unless we are explicitly looking for it or until its too late and the program crashes</a:t>
             </a:r>
           </a:p>
         </p:txBody>
@@ -18903,7 +20055,11 @@
           <a:bodyPr/>
           <a:lstStyle/>
           <a:p>
-            <a:endParaRPr lang="en-US"/>
+            <a:pPr algn="ctr"/>
+            <a:r>
+              <a:rPr lang="en-US" b="1" dirty="0"/>
+              <a:t>So what does that mean</a:t>
+            </a:r>
           </a:p>
         </p:txBody>
       </p:sp>
@@ -18928,7 +20084,77 @@
           <a:bodyPr/>
           <a:lstStyle/>
           <a:p>
-            <a:endParaRPr lang="en-US"/>
+            <a:r>
+              <a:rPr lang="en-US" dirty="0"/>
+              <a:t>Because C++ gives us so much control, its our responsibility to clean up after ourselves, so we need to </a:t>
+            </a:r>
+            <a:r>
+              <a:rPr lang="en-US" b="1" u="sng" dirty="0"/>
+              <a:t>free</a:t>
+            </a:r>
+            <a:r>
+              <a:rPr lang="en-US" dirty="0"/>
+              <a:t> any </a:t>
+            </a:r>
+            <a:r>
+              <a:rPr lang="en-US" b="1" dirty="0"/>
+              <a:t>memory we have allocated</a:t>
+            </a:r>
+          </a:p>
+          <a:p>
+            <a:endParaRPr lang="en-US" b="1" dirty="0"/>
+          </a:p>
+          <a:p>
+            <a:r>
+              <a:rPr lang="en-US" dirty="0"/>
+              <a:t>So how do we know when there is a memory leak?</a:t>
+            </a:r>
+          </a:p>
+          <a:p>
+            <a:pPr lvl="1"/>
+            <a:r>
+              <a:rPr lang="en-US" dirty="0"/>
+              <a:t>There are tools which can help us diagnose this (</a:t>
+            </a:r>
+            <a:r>
+              <a:rPr lang="en-US" dirty="0" err="1"/>
+              <a:t>valgrind</a:t>
+            </a:r>
+            <a:r>
+              <a:rPr lang="en-US" dirty="0"/>
+              <a:t>, </a:t>
+            </a:r>
+            <a:r>
+              <a:rPr lang="en-US" dirty="0" err="1"/>
+              <a:t>Clnag’s</a:t>
+            </a:r>
+            <a:r>
+              <a:rPr lang="en-US" dirty="0"/>
+              <a:t> –</a:t>
+            </a:r>
+            <a:r>
+              <a:rPr lang="en-US" dirty="0" err="1"/>
+              <a:t>fsanitize</a:t>
+            </a:r>
+            <a:r>
+              <a:rPr lang="en-US" dirty="0"/>
+              <a:t>, </a:t>
+            </a:r>
+            <a:r>
+              <a:rPr lang="en-US" dirty="0" err="1"/>
+              <a:t>etc</a:t>
+            </a:r>
+            <a:r>
+              <a:rPr lang="en-US" dirty="0"/>
+              <a:t>)</a:t>
+            </a:r>
+          </a:p>
+          <a:p>
+            <a:pPr lvl="1"/>
+            <a:r>
+              <a:rPr lang="en-US" dirty="0"/>
+              <a:t>But lets try to manually go through and see if we can figure out where this is happening</a:t>
+            </a:r>
           </a:p>
         </p:txBody>
       </p:sp>
@@ -18936,6 +20162,223 @@
     <p:extLst>
       <p:ext uri="{BB962C8B-B14F-4D97-AF65-F5344CB8AC3E}">
         <p14:creationId xmlns:p14="http://schemas.microsoft.com/office/powerpoint/2010/main" val="431872732"/>
+      </p:ext>
+    </p:extLst>
+  </p:cSld>
+  <p:clrMapOvr>
+    <a:masterClrMapping/>
+  </p:clrMapOvr>
+</p:sld>
+</file>
+
+<file path=ppt/slides/slide35.xml><?xml version="1.0" encoding="utf-8"?>
+<p:sld xmlns:a="http://schemas.openxmlformats.org/drawingml/2006/main" xmlns:r="http://schemas.openxmlformats.org/officeDocument/2006/relationships" xmlns:p="http://schemas.openxmlformats.org/presentationml/2006/main">
+  <p:cSld>
+    <p:spTree>
+      <p:nvGrpSpPr>
+        <p:cNvPr id="1" name=""/>
+        <p:cNvGrpSpPr/>
+        <p:nvPr/>
+      </p:nvGrpSpPr>
+      <p:grpSpPr>
+        <a:xfrm>
+          <a:off x="0" y="0"/>
+          <a:ext cx="0" cy="0"/>
+          <a:chOff x="0" y="0"/>
+          <a:chExt cx="0" cy="0"/>
+        </a:xfrm>
+      </p:grpSpPr>
+      <p:sp>
+        <p:nvSpPr>
+          <p:cNvPr id="2" name="Title 1">
+            <a:extLst>
+              <a:ext uri="{FF2B5EF4-FFF2-40B4-BE49-F238E27FC236}">
+                <a16:creationId xmlns:a16="http://schemas.microsoft.com/office/drawing/2014/main" id="{6868AE09-B356-EF47-9B27-1BEDE5B438AA}"/>
+              </a:ext>
+            </a:extLst>
+          </p:cNvPr>
+          <p:cNvSpPr>
+            <a:spLocks noGrp="1"/>
+          </p:cNvSpPr>
+          <p:nvPr>
+            <p:ph type="title"/>
+          </p:nvPr>
+        </p:nvSpPr>
+        <p:spPr/>
+        <p:txBody>
+          <a:bodyPr/>
+          <a:lstStyle/>
+          <a:p>
+            <a:pPr algn="ctr"/>
+            <a:r>
+              <a:rPr lang="en-US" b="1" dirty="0"/>
+              <a:t>Deleting objects</a:t>
+            </a:r>
+          </a:p>
+        </p:txBody>
+      </p:sp>
+      <p:sp>
+        <p:nvSpPr>
+          <p:cNvPr id="3" name="Content Placeholder 2">
+            <a:extLst>
+              <a:ext uri="{FF2B5EF4-FFF2-40B4-BE49-F238E27FC236}">
+                <a16:creationId xmlns:a16="http://schemas.microsoft.com/office/drawing/2014/main" id="{3E19BC4D-A2DB-234A-AF06-58D209B933EB}"/>
+              </a:ext>
+            </a:extLst>
+          </p:cNvPr>
+          <p:cNvSpPr>
+            <a:spLocks noGrp="1"/>
+          </p:cNvSpPr>
+          <p:nvPr>
+            <p:ph idx="1"/>
+          </p:nvPr>
+        </p:nvSpPr>
+        <p:spPr>
+          <a:xfrm>
+            <a:off x="1141412" y="2249486"/>
+            <a:ext cx="9905999" cy="3989995"/>
+          </a:xfrm>
+        </p:spPr>
+        <p:txBody>
+          <a:bodyPr>
+            <a:normAutofit fontScale="85000" lnSpcReduction="20000"/>
+          </a:bodyPr>
+          <a:lstStyle/>
+          <a:p>
+            <a:r>
+              <a:rPr lang="en-US" dirty="0"/>
+              <a:t>Whenever we have used </a:t>
+            </a:r>
+            <a:r>
+              <a:rPr lang="en-US" sz="1800" dirty="0">
+                <a:solidFill>
+                  <a:srgbClr val="FF79B2"/>
+                </a:solidFill>
+                <a:latin typeface="Consolas" panose="020B0609020204030204" pitchFamily="49" charset="0"/>
+                <a:cs typeface="Consolas" panose="020B0609020204030204" pitchFamily="49" charset="0"/>
+              </a:rPr>
+              <a:t>new</a:t>
+            </a:r>
+            <a:r>
+              <a:rPr lang="en-US" dirty="0"/>
+              <a:t> to allocate some memory, must use </a:t>
+            </a:r>
+            <a:r>
+              <a:rPr lang="en-US" sz="1800" dirty="0">
+                <a:solidFill>
+                  <a:srgbClr val="FF79B2"/>
+                </a:solidFill>
+                <a:latin typeface="Consolas" panose="020B0609020204030204" pitchFamily="49" charset="0"/>
+                <a:cs typeface="Consolas" panose="020B0609020204030204" pitchFamily="49" charset="0"/>
+              </a:rPr>
+              <a:t>delete</a:t>
+            </a:r>
+            <a:r>
+              <a:rPr lang="en-US" dirty="0"/>
+              <a:t> to free that memory again</a:t>
+            </a:r>
+          </a:p>
+          <a:p>
+            <a:endParaRPr lang="en-US" dirty="0"/>
+          </a:p>
+          <a:p>
+            <a:r>
+              <a:rPr lang="en-US" dirty="0"/>
+              <a:t>This can be done by simply doing: </a:t>
+            </a:r>
+          </a:p>
+          <a:p>
+            <a:pPr lvl="1"/>
+            <a:r>
+              <a:rPr lang="en-US" sz="1600" dirty="0">
+                <a:solidFill>
+                  <a:srgbClr val="FF79B2"/>
+                </a:solidFill>
+                <a:latin typeface="Consolas" panose="020B0609020204030204" pitchFamily="49" charset="0"/>
+                <a:cs typeface="Consolas" panose="020B0609020204030204" pitchFamily="49" charset="0"/>
+              </a:rPr>
+              <a:t>delete</a:t>
+            </a:r>
+            <a:r>
+              <a:rPr lang="en-US" sz="1600" dirty="0">
+                <a:latin typeface="Consolas" panose="020B0609020204030204" pitchFamily="49" charset="0"/>
+                <a:cs typeface="Consolas" panose="020B0609020204030204" pitchFamily="49" charset="0"/>
+              </a:rPr>
+              <a:t> </a:t>
+            </a:r>
+            <a:r>
+              <a:rPr lang="en-US" sz="1600" dirty="0" err="1">
+                <a:latin typeface="Consolas" panose="020B0609020204030204" pitchFamily="49" charset="0"/>
+                <a:cs typeface="Consolas" panose="020B0609020204030204" pitchFamily="49" charset="0"/>
+              </a:rPr>
+              <a:t>pCarObject</a:t>
+            </a:r>
+            <a:r>
+              <a:rPr lang="en-US" sz="1600" dirty="0">
+                <a:latin typeface="Consolas" panose="020B0609020204030204" pitchFamily="49" charset="0"/>
+                <a:cs typeface="Consolas" panose="020B0609020204030204" pitchFamily="49" charset="0"/>
+              </a:rPr>
+              <a:t>; </a:t>
+            </a:r>
+          </a:p>
+          <a:p>
+            <a:pPr lvl="1"/>
+            <a:r>
+              <a:rPr lang="en-US" sz="1600" dirty="0">
+                <a:solidFill>
+                  <a:srgbClr val="FF79B2"/>
+                </a:solidFill>
+                <a:latin typeface="Consolas" panose="020B0609020204030204" pitchFamily="49" charset="0"/>
+                <a:cs typeface="Consolas" panose="020B0609020204030204" pitchFamily="49" charset="0"/>
+              </a:rPr>
+              <a:t>delete</a:t>
+            </a:r>
+            <a:r>
+              <a:rPr lang="en-US" sz="1600" dirty="0">
+                <a:latin typeface="Consolas" panose="020B0609020204030204" pitchFamily="49" charset="0"/>
+                <a:cs typeface="Consolas" panose="020B0609020204030204" pitchFamily="49" charset="0"/>
+              </a:rPr>
+              <a:t> </a:t>
+            </a:r>
+            <a:r>
+              <a:rPr lang="en-US" sz="1600" dirty="0" err="1">
+                <a:latin typeface="Consolas" panose="020B0609020204030204" pitchFamily="49" charset="0"/>
+                <a:cs typeface="Consolas" panose="020B0609020204030204" pitchFamily="49" charset="0"/>
+              </a:rPr>
+              <a:t>pElectricCarObject</a:t>
+            </a:r>
+            <a:r>
+              <a:rPr lang="en-US" sz="1600" dirty="0">
+                <a:latin typeface="Consolas" panose="020B0609020204030204" pitchFamily="49" charset="0"/>
+                <a:cs typeface="Consolas" panose="020B0609020204030204" pitchFamily="49" charset="0"/>
+              </a:rPr>
+              <a:t>;</a:t>
+            </a:r>
+          </a:p>
+          <a:p>
+            <a:endParaRPr lang="en-US" dirty="0"/>
+          </a:p>
+          <a:p>
+            <a:r>
+              <a:rPr lang="en-US" dirty="0"/>
+              <a:t>Must be done before the program terminates</a:t>
+            </a:r>
+          </a:p>
+          <a:p>
+            <a:endParaRPr lang="en-US" dirty="0"/>
+          </a:p>
+          <a:p>
+            <a:r>
+              <a:rPr lang="en-US" dirty="0"/>
+              <a:t>For the next 2 minutes, try cleaning up your code using what we just said</a:t>
+            </a:r>
+          </a:p>
+        </p:txBody>
+      </p:sp>
+    </p:spTree>
+    <p:extLst>
+      <p:ext uri="{BB962C8B-B14F-4D97-AF65-F5344CB8AC3E}">
+        <p14:creationId xmlns:p14="http://schemas.microsoft.com/office/powerpoint/2010/main" val="1983748004"/>
       </p:ext>
     </p:extLst>
   </p:cSld>
@@ -19009,12 +20452,14 @@
         </p:nvSpPr>
         <p:spPr>
           <a:xfrm>
-            <a:off x="1141412" y="2249487"/>
-            <a:ext cx="10172158" cy="2129410"/>
+            <a:off x="1141412" y="2249486"/>
+            <a:ext cx="10172158" cy="3327747"/>
           </a:xfrm>
         </p:spPr>
         <p:txBody>
-          <a:bodyPr/>
+          <a:bodyPr>
+            <a:normAutofit lnSpcReduction="10000"/>
+          </a:bodyPr>
           <a:lstStyle/>
           <a:p>
             <a:r>
@@ -19035,6 +20480,15 @@
               <a:rPr lang="en-US" dirty="0"/>
               <a:t> is</a:t>
             </a:r>
+          </a:p>
+          <a:p>
+            <a:endParaRPr lang="en-US" dirty="0"/>
+          </a:p>
+          <a:p>
+            <a:endParaRPr lang="en-US" dirty="0"/>
+          </a:p>
+          <a:p>
+            <a:endParaRPr lang="en-US" dirty="0"/>
           </a:p>
           <a:p>
             <a:endParaRPr lang="en-US" dirty="0"/>
@@ -20530,7 +21984,15 @@
             <a:pPr algn="ctr"/>
             <a:r>
               <a:rPr lang="en-US" b="1" dirty="0"/>
-              <a:t>Class</a:t>
+              <a:t>The </a:t>
+            </a:r>
+            <a:r>
+              <a:rPr lang="en-US" b="1" dirty="0" err="1"/>
+              <a:t>c++</a:t>
+            </a:r>
+            <a:r>
+              <a:rPr lang="en-US" b="1" dirty="0"/>
+              <a:t> Class</a:t>
             </a:r>
           </a:p>
         </p:txBody>
@@ -20617,7 +22079,23 @@
           <a:p>
             <a:r>
               <a:rPr lang="en-US" dirty="0"/>
-              <a:t>We can think of classes like a blueprint for something we want to build</a:t>
+              <a:t>We can think of </a:t>
+            </a:r>
+            <a:r>
+              <a:rPr lang="en-US" b="1" dirty="0"/>
+              <a:t>classes</a:t>
+            </a:r>
+            <a:r>
+              <a:rPr lang="en-US" dirty="0"/>
+              <a:t> like a </a:t>
+            </a:r>
+            <a:r>
+              <a:rPr lang="en-US" b="1" dirty="0"/>
+              <a:t>blueprint for something </a:t>
+            </a:r>
+            <a:r>
+              <a:rPr lang="en-US" dirty="0"/>
+              <a:t>we want to build</a:t>
             </a:r>
           </a:p>
           <a:p>
@@ -20665,6 +22143,42 @@
           </a:p>
         </p:txBody>
       </p:sp>
+      <p:pic>
+        <p:nvPicPr>
+          <p:cNvPr id="5" name="Graphic 4" descr="Venn diagram">
+            <a:extLst>
+              <a:ext uri="{FF2B5EF4-FFF2-40B4-BE49-F238E27FC236}">
+                <a16:creationId xmlns:a16="http://schemas.microsoft.com/office/drawing/2014/main" id="{5945DB6D-3F0F-FF40-9AE4-2FFE6B269C18}"/>
+              </a:ext>
+            </a:extLst>
+          </p:cNvPr>
+          <p:cNvPicPr>
+            <a:picLocks noChangeAspect="1"/>
+          </p:cNvPicPr>
+          <p:nvPr/>
+        </p:nvPicPr>
+        <p:blipFill>
+          <a:blip r:embed="rId2">
+            <a:extLst>
+              <a:ext uri="{96DAC541-7B7A-43D3-8B79-37D633B846F1}">
+                <asvg:svgBlip xmlns:asvg="http://schemas.microsoft.com/office/drawing/2016/SVG/main" r:embed="rId3"/>
+              </a:ext>
+            </a:extLst>
+          </a:blip>
+          <a:stretch>
+            <a:fillRect/>
+          </a:stretch>
+        </p:blipFill>
+        <p:spPr>
+          <a:xfrm>
+            <a:off x="8121608" y="771832"/>
+            <a:ext cx="1171942" cy="1171942"/>
+          </a:xfrm>
+          <a:prstGeom prst="rect">
+            <a:avLst/>
+          </a:prstGeom>
+        </p:spPr>
+      </p:pic>
     </p:spTree>
     <p:extLst>
       <p:ext uri="{BB962C8B-B14F-4D97-AF65-F5344CB8AC3E}">
@@ -20927,4 +22441,299 @@
     </a:ext>
   </a:extLst>
 </a:theme>
+</file>
+
+<file path=ppt/theme/theme2.xml><?xml version="1.0" encoding="utf-8"?>
+<a:theme xmlns:a="http://schemas.openxmlformats.org/drawingml/2006/main" name="Office Theme">
+  <a:themeElements>
+    <a:clrScheme name="Office">
+      <a:dk1>
+        <a:sysClr val="windowText" lastClr="000000"/>
+      </a:dk1>
+      <a:lt1>
+        <a:sysClr val="window" lastClr="FFFFFF"/>
+      </a:lt1>
+      <a:dk2>
+        <a:srgbClr val="44546A"/>
+      </a:dk2>
+      <a:lt2>
+        <a:srgbClr val="E7E6E6"/>
+      </a:lt2>
+      <a:accent1>
+        <a:srgbClr val="4472C4"/>
+      </a:accent1>
+      <a:accent2>
+        <a:srgbClr val="ED7D31"/>
+      </a:accent2>
+      <a:accent3>
+        <a:srgbClr val="A5A5A5"/>
+      </a:accent3>
+      <a:accent4>
+        <a:srgbClr val="FFC000"/>
+      </a:accent4>
+      <a:accent5>
+        <a:srgbClr val="5B9BD5"/>
+      </a:accent5>
+      <a:accent6>
+        <a:srgbClr val="70AD47"/>
+      </a:accent6>
+      <a:hlink>
+        <a:srgbClr val="0563C1"/>
+      </a:hlink>
+      <a:folHlink>
+        <a:srgbClr val="954F72"/>
+      </a:folHlink>
+    </a:clrScheme>
+    <a:fontScheme name="Office">
+      <a:majorFont>
+        <a:latin typeface="Calibri Light" panose="020F0302020204030204"/>
+        <a:ea typeface=""/>
+        <a:cs typeface=""/>
+        <a:font script="Jpan" typeface="游ゴシック Light"/>
+        <a:font script="Hang" typeface="맑은 고딕"/>
+        <a:font script="Hans" typeface="等线 Light"/>
+        <a:font script="Hant" typeface="新細明體"/>
+        <a:font script="Arab" typeface="Times New Roman"/>
+        <a:font script="Hebr" typeface="Times New Roman"/>
+        <a:font script="Thai" typeface="Angsana New"/>
+        <a:font script="Ethi" typeface="Nyala"/>
+        <a:font script="Beng" typeface="Vrinda"/>
+        <a:font script="Gujr" typeface="Shruti"/>
+        <a:font script="Khmr" typeface="MoolBoran"/>
+        <a:font script="Knda" typeface="Tunga"/>
+        <a:font script="Guru" typeface="Raavi"/>
+        <a:font script="Cans" typeface="Euphemia"/>
+        <a:font script="Cher" typeface="Plantagenet Cherokee"/>
+        <a:font script="Yiii" typeface="Microsoft Yi Baiti"/>
+        <a:font script="Tibt" typeface="Microsoft Himalaya"/>
+        <a:font script="Thaa" typeface="MV Boli"/>
+        <a:font script="Deva" typeface="Mangal"/>
+        <a:font script="Telu" typeface="Gautami"/>
+        <a:font script="Taml" typeface="Latha"/>
+        <a:font script="Syrc" typeface="Estrangelo Edessa"/>
+        <a:font script="Orya" typeface="Kalinga"/>
+        <a:font script="Mlym" typeface="Kartika"/>
+        <a:font script="Laoo" typeface="DokChampa"/>
+        <a:font script="Sinh" typeface="Iskoola Pota"/>
+        <a:font script="Mong" typeface="Mongolian Baiti"/>
+        <a:font script="Viet" typeface="Times New Roman"/>
+        <a:font script="Uigh" typeface="Microsoft Uighur"/>
+        <a:font script="Geor" typeface="Sylfaen"/>
+        <a:font script="Armn" typeface="Arial"/>
+        <a:font script="Bugi" typeface="Leelawadee UI"/>
+        <a:font script="Bopo" typeface="Microsoft JhengHei"/>
+        <a:font script="Java" typeface="Javanese Text"/>
+        <a:font script="Lisu" typeface="Segoe UI"/>
+        <a:font script="Mymr" typeface="Myanmar Text"/>
+        <a:font script="Nkoo" typeface="Ebrima"/>
+        <a:font script="Olck" typeface="Nirmala UI"/>
+        <a:font script="Osma" typeface="Ebrima"/>
+        <a:font script="Phag" typeface="Phagspa"/>
+        <a:font script="Syrn" typeface="Estrangelo Edessa"/>
+        <a:font script="Syrj" typeface="Estrangelo Edessa"/>
+        <a:font script="Syre" typeface="Estrangelo Edessa"/>
+        <a:font script="Sora" typeface="Nirmala UI"/>
+        <a:font script="Tale" typeface="Microsoft Tai Le"/>
+        <a:font script="Talu" typeface="Microsoft New Tai Lue"/>
+        <a:font script="Tfng" typeface="Ebrima"/>
+      </a:majorFont>
+      <a:minorFont>
+        <a:latin typeface="Calibri" panose="020F0502020204030204"/>
+        <a:ea typeface=""/>
+        <a:cs typeface=""/>
+        <a:font script="Jpan" typeface="游ゴシック"/>
+        <a:font script="Hang" typeface="맑은 고딕"/>
+        <a:font script="Hans" typeface="等线"/>
+        <a:font script="Hant" typeface="新細明體"/>
+        <a:font script="Arab" typeface="Arial"/>
+        <a:font script="Hebr" typeface="Arial"/>
+        <a:font script="Thai" typeface="Cordia New"/>
+        <a:font script="Ethi" typeface="Nyala"/>
+        <a:font script="Beng" typeface="Vrinda"/>
+        <a:font script="Gujr" typeface="Shruti"/>
+        <a:font script="Khmr" typeface="DaunPenh"/>
+        <a:font script="Knda" typeface="Tunga"/>
+        <a:font script="Guru" typeface="Raavi"/>
+        <a:font script="Cans" typeface="Euphemia"/>
+        <a:font script="Cher" typeface="Plantagenet Cherokee"/>
+        <a:font script="Yiii" typeface="Microsoft Yi Baiti"/>
+        <a:font script="Tibt" typeface="Microsoft Himalaya"/>
+        <a:font script="Thaa" typeface="MV Boli"/>
+        <a:font script="Deva" typeface="Mangal"/>
+        <a:font script="Telu" typeface="Gautami"/>
+        <a:font script="Taml" typeface="Latha"/>
+        <a:font script="Syrc" typeface="Estrangelo Edessa"/>
+        <a:font script="Orya" typeface="Kalinga"/>
+        <a:font script="Mlym" typeface="Kartika"/>
+        <a:font script="Laoo" typeface="DokChampa"/>
+        <a:font script="Sinh" typeface="Iskoola Pota"/>
+        <a:font script="Mong" typeface="Mongolian Baiti"/>
+        <a:font script="Viet" typeface="Arial"/>
+        <a:font script="Uigh" typeface="Microsoft Uighur"/>
+        <a:font script="Geor" typeface="Sylfaen"/>
+        <a:font script="Armn" typeface="Arial"/>
+        <a:font script="Bugi" typeface="Leelawadee UI"/>
+        <a:font script="Bopo" typeface="Microsoft JhengHei"/>
+        <a:font script="Java" typeface="Javanese Text"/>
+        <a:font script="Lisu" typeface="Segoe UI"/>
+        <a:font script="Mymr" typeface="Myanmar Text"/>
+        <a:font script="Nkoo" typeface="Ebrima"/>
+        <a:font script="Olck" typeface="Nirmala UI"/>
+        <a:font script="Osma" typeface="Ebrima"/>
+        <a:font script="Phag" typeface="Phagspa"/>
+        <a:font script="Syrn" typeface="Estrangelo Edessa"/>
+        <a:font script="Syrj" typeface="Estrangelo Edessa"/>
+        <a:font script="Syre" typeface="Estrangelo Edessa"/>
+        <a:font script="Sora" typeface="Nirmala UI"/>
+        <a:font script="Tale" typeface="Microsoft Tai Le"/>
+        <a:font script="Talu" typeface="Microsoft New Tai Lue"/>
+        <a:font script="Tfng" typeface="Ebrima"/>
+      </a:minorFont>
+    </a:fontScheme>
+    <a:fmtScheme name="Office">
+      <a:fillStyleLst>
+        <a:solidFill>
+          <a:schemeClr val="phClr"/>
+        </a:solidFill>
+        <a:gradFill rotWithShape="1">
+          <a:gsLst>
+            <a:gs pos="0">
+              <a:schemeClr val="phClr">
+                <a:lumMod val="110000"/>
+                <a:satMod val="105000"/>
+                <a:tint val="67000"/>
+              </a:schemeClr>
+            </a:gs>
+            <a:gs pos="50000">
+              <a:schemeClr val="phClr">
+                <a:lumMod val="105000"/>
+                <a:satMod val="103000"/>
+                <a:tint val="73000"/>
+              </a:schemeClr>
+            </a:gs>
+            <a:gs pos="100000">
+              <a:schemeClr val="phClr">
+                <a:lumMod val="105000"/>
+                <a:satMod val="109000"/>
+                <a:tint val="81000"/>
+              </a:schemeClr>
+            </a:gs>
+          </a:gsLst>
+          <a:lin ang="5400000" scaled="0"/>
+        </a:gradFill>
+        <a:gradFill rotWithShape="1">
+          <a:gsLst>
+            <a:gs pos="0">
+              <a:schemeClr val="phClr">
+                <a:satMod val="103000"/>
+                <a:lumMod val="102000"/>
+                <a:tint val="94000"/>
+              </a:schemeClr>
+            </a:gs>
+            <a:gs pos="50000">
+              <a:schemeClr val="phClr">
+                <a:satMod val="110000"/>
+                <a:lumMod val="100000"/>
+                <a:shade val="100000"/>
+              </a:schemeClr>
+            </a:gs>
+            <a:gs pos="100000">
+              <a:schemeClr val="phClr">
+                <a:lumMod val="99000"/>
+                <a:satMod val="120000"/>
+                <a:shade val="78000"/>
+              </a:schemeClr>
+            </a:gs>
+          </a:gsLst>
+          <a:lin ang="5400000" scaled="0"/>
+        </a:gradFill>
+      </a:fillStyleLst>
+      <a:lnStyleLst>
+        <a:ln w="6350" cap="flat" cmpd="sng" algn="ctr">
+          <a:solidFill>
+            <a:schemeClr val="phClr"/>
+          </a:solidFill>
+          <a:prstDash val="solid"/>
+          <a:miter lim="800000"/>
+        </a:ln>
+        <a:ln w="12700" cap="flat" cmpd="sng" algn="ctr">
+          <a:solidFill>
+            <a:schemeClr val="phClr"/>
+          </a:solidFill>
+          <a:prstDash val="solid"/>
+          <a:miter lim="800000"/>
+        </a:ln>
+        <a:ln w="19050" cap="flat" cmpd="sng" algn="ctr">
+          <a:solidFill>
+            <a:schemeClr val="phClr"/>
+          </a:solidFill>
+          <a:prstDash val="solid"/>
+          <a:miter lim="800000"/>
+        </a:ln>
+      </a:lnStyleLst>
+      <a:effectStyleLst>
+        <a:effectStyle>
+          <a:effectLst/>
+        </a:effectStyle>
+        <a:effectStyle>
+          <a:effectLst/>
+        </a:effectStyle>
+        <a:effectStyle>
+          <a:effectLst>
+            <a:outerShdw blurRad="57150" dist="19050" dir="5400000" algn="ctr" rotWithShape="0">
+              <a:srgbClr val="000000">
+                <a:alpha val="63000"/>
+              </a:srgbClr>
+            </a:outerShdw>
+          </a:effectLst>
+        </a:effectStyle>
+      </a:effectStyleLst>
+      <a:bgFillStyleLst>
+        <a:solidFill>
+          <a:schemeClr val="phClr"/>
+        </a:solidFill>
+        <a:solidFill>
+          <a:schemeClr val="phClr">
+            <a:tint val="95000"/>
+            <a:satMod val="170000"/>
+          </a:schemeClr>
+        </a:solidFill>
+        <a:gradFill rotWithShape="1">
+          <a:gsLst>
+            <a:gs pos="0">
+              <a:schemeClr val="phClr">
+                <a:tint val="93000"/>
+                <a:satMod val="150000"/>
+                <a:shade val="98000"/>
+                <a:lumMod val="102000"/>
+              </a:schemeClr>
+            </a:gs>
+            <a:gs pos="50000">
+              <a:schemeClr val="phClr">
+                <a:tint val="98000"/>
+                <a:satMod val="130000"/>
+                <a:shade val="90000"/>
+                <a:lumMod val="103000"/>
+              </a:schemeClr>
+            </a:gs>
+            <a:gs pos="100000">
+              <a:schemeClr val="phClr">
+                <a:shade val="63000"/>
+                <a:satMod val="120000"/>
+              </a:schemeClr>
+            </a:gs>
+          </a:gsLst>
+          <a:lin ang="5400000" scaled="0"/>
+        </a:gradFill>
+      </a:bgFillStyleLst>
+    </a:fmtScheme>
+  </a:themeElements>
+  <a:objectDefaults/>
+  <a:extraClrSchemeLst/>
+  <a:extLst>
+    <a:ext uri="{05A4C25C-085E-4340-85A3-A5531E510DB2}">
+      <thm15:themeFamily xmlns:thm15="http://schemas.microsoft.com/office/thememl/2012/main" name="Office Theme" id="{62F939B6-93AF-4DB8-9C6B-D6C7DFDC589F}" vid="{4A3C46E8-61CC-4603-A589-7422A47A8E4A}"/>
+    </a:ext>
+  </a:extLst>
+</a:theme>
 </file>
</xml_diff>